<commit_message>
ppt edits, mysql plugin, db testing
</commit_message>
<xml_diff>
--- a/docs/Final-Slidedeck.pptx
+++ b/docs/Final-Slidedeck.pptx
@@ -112,6 +112,11 @@
       </a:defRPr>
     </a:lvl9pPr>
   </p:defaultTextStyle>
+  <p:extLst>
+    <p:ext uri="{EFAFB233-063F-42B5-8137-9DF3F51BA10A}">
+      <p15:sldGuideLst xmlns:p15="http://schemas.microsoft.com/office/powerpoint/2012/main"/>
+    </p:ext>
+  </p:extLst>
 </p:presentation>
 </file>
 
@@ -172,7 +177,7 @@
           <a:noFill/>
           <a:extLst>
             <a:ext uri="{909E8E84-426E-40dd-AFC4-6F175D3DCCD1}">
-              <a14:hiddenFill xmlns:a14="http://schemas.microsoft.com/office/drawing/2010/main" xmlns="">
+              <a14:hiddenFill xmlns="" xmlns:a14="http://schemas.microsoft.com/office/drawing/2010/main">
                 <a:solidFill>
                   <a:srgbClr val="FFFFFF"/>
                 </a:solidFill>
@@ -231,7 +236,7 @@
             </a:ln>
             <a:extLst>
               <a:ext uri="{91240B29-F687-4f45-9708-019B960494DF}">
-                <a14:hiddenLine xmlns:a14="http://schemas.microsoft.com/office/drawing/2010/main" xmlns="" w="9525">
+                <a14:hiddenLine xmlns="" xmlns:a14="http://schemas.microsoft.com/office/drawing/2010/main" w="9525">
                   <a:solidFill>
                     <a:srgbClr val="000000"/>
                   </a:solidFill>
@@ -321,7 +326,7 @@
             </a:ln>
             <a:extLst>
               <a:ext uri="{91240B29-F687-4f45-9708-019B960494DF}">
-                <a14:hiddenLine xmlns:a14="http://schemas.microsoft.com/office/drawing/2010/main" xmlns="" w="9525">
+                <a14:hiddenLine xmlns="" xmlns:a14="http://schemas.microsoft.com/office/drawing/2010/main" w="9525">
                   <a:solidFill>
                     <a:srgbClr val="000000"/>
                   </a:solidFill>
@@ -411,7 +416,7 @@
             </a:ln>
             <a:extLst>
               <a:ext uri="{91240B29-F687-4f45-9708-019B960494DF}">
-                <a14:hiddenLine xmlns:a14="http://schemas.microsoft.com/office/drawing/2010/main" xmlns="" w="9525">
+                <a14:hiddenLine xmlns="" xmlns:a14="http://schemas.microsoft.com/office/drawing/2010/main" w="9525">
                   <a:solidFill>
                     <a:srgbClr val="000000"/>
                   </a:solidFill>
@@ -445,7 +450,7 @@
             </a:ln>
             <a:extLst>
               <a:ext uri="{91240B29-F687-4f45-9708-019B960494DF}">
-                <a14:hiddenLine xmlns:a14="http://schemas.microsoft.com/office/drawing/2010/main" xmlns="" w="9525">
+                <a14:hiddenLine xmlns="" xmlns:a14="http://schemas.microsoft.com/office/drawing/2010/main" w="9525">
                   <a:solidFill>
                     <a:srgbClr val="000000"/>
                   </a:solidFill>
@@ -535,7 +540,7 @@
             </a:ln>
             <a:extLst>
               <a:ext uri="{91240B29-F687-4f45-9708-019B960494DF}">
-                <a14:hiddenLine xmlns:a14="http://schemas.microsoft.com/office/drawing/2010/main" xmlns="" w="9525">
+                <a14:hiddenLine xmlns="" xmlns:a14="http://schemas.microsoft.com/office/drawing/2010/main" w="9525">
                   <a:solidFill>
                     <a:srgbClr val="000000"/>
                   </a:solidFill>
@@ -597,7 +602,7 @@
             </a:ln>
             <a:extLst>
               <a:ext uri="{91240B29-F687-4f45-9708-019B960494DF}">
-                <a14:hiddenLine xmlns:a14="http://schemas.microsoft.com/office/drawing/2010/main" xmlns="" w="9525">
+                <a14:hiddenLine xmlns="" xmlns:a14="http://schemas.microsoft.com/office/drawing/2010/main" w="9525">
                   <a:solidFill>
                     <a:srgbClr val="000000"/>
                   </a:solidFill>
@@ -659,7 +664,7 @@
             </a:ln>
             <a:extLst>
               <a:ext uri="{91240B29-F687-4f45-9708-019B960494DF}">
-                <a14:hiddenLine xmlns:a14="http://schemas.microsoft.com/office/drawing/2010/main" xmlns="" w="9525">
+                <a14:hiddenLine xmlns="" xmlns:a14="http://schemas.microsoft.com/office/drawing/2010/main" w="9525">
                   <a:solidFill>
                     <a:srgbClr val="000000"/>
                   </a:solidFill>
@@ -749,7 +754,7 @@
             </a:ln>
             <a:extLst>
               <a:ext uri="{91240B29-F687-4f45-9708-019B960494DF}">
-                <a14:hiddenLine xmlns:a14="http://schemas.microsoft.com/office/drawing/2010/main" xmlns="" w="9525">
+                <a14:hiddenLine xmlns="" xmlns:a14="http://schemas.microsoft.com/office/drawing/2010/main" w="9525">
                   <a:solidFill>
                     <a:srgbClr val="000000"/>
                   </a:solidFill>
@@ -811,7 +816,7 @@
             </a:ln>
             <a:extLst>
               <a:ext uri="{91240B29-F687-4f45-9708-019B960494DF}">
-                <a14:hiddenLine xmlns:a14="http://schemas.microsoft.com/office/drawing/2010/main" xmlns="" w="9525">
+                <a14:hiddenLine xmlns="" xmlns:a14="http://schemas.microsoft.com/office/drawing/2010/main" w="9525">
                   <a:solidFill>
                     <a:srgbClr val="000000"/>
                   </a:solidFill>
@@ -873,7 +878,7 @@
             </a:ln>
             <a:extLst>
               <a:ext uri="{91240B29-F687-4f45-9708-019B960494DF}">
-                <a14:hiddenLine xmlns:a14="http://schemas.microsoft.com/office/drawing/2010/main" xmlns="" w="9525">
+                <a14:hiddenLine xmlns="" xmlns:a14="http://schemas.microsoft.com/office/drawing/2010/main" w="9525">
                   <a:solidFill>
                     <a:srgbClr val="000000"/>
                   </a:solidFill>
@@ -963,7 +968,7 @@
             </a:ln>
             <a:extLst>
               <a:ext uri="{91240B29-F687-4f45-9708-019B960494DF}">
-                <a14:hiddenLine xmlns:a14="http://schemas.microsoft.com/office/drawing/2010/main" xmlns="" w="9525">
+                <a14:hiddenLine xmlns="" xmlns:a14="http://schemas.microsoft.com/office/drawing/2010/main" w="9525">
                   <a:solidFill>
                     <a:srgbClr val="000000"/>
                   </a:solidFill>
@@ -1053,7 +1058,7 @@
             </a:ln>
             <a:extLst>
               <a:ext uri="{91240B29-F687-4f45-9708-019B960494DF}">
-                <a14:hiddenLine xmlns:a14="http://schemas.microsoft.com/office/drawing/2010/main" xmlns="" w="9525">
+                <a14:hiddenLine xmlns="" xmlns:a14="http://schemas.microsoft.com/office/drawing/2010/main" w="9525">
                   <a:solidFill>
                     <a:srgbClr val="000000"/>
                   </a:solidFill>
@@ -1115,7 +1120,7 @@
             </a:ln>
             <a:extLst>
               <a:ext uri="{91240B29-F687-4f45-9708-019B960494DF}">
-                <a14:hiddenLine xmlns:a14="http://schemas.microsoft.com/office/drawing/2010/main" xmlns="" w="9525">
+                <a14:hiddenLine xmlns="" xmlns:a14="http://schemas.microsoft.com/office/drawing/2010/main" w="9525">
                   <a:solidFill>
                     <a:srgbClr val="000000"/>
                   </a:solidFill>
@@ -1225,7 +1230,7 @@
             </a:ln>
             <a:extLst>
               <a:ext uri="{91240B29-F687-4f45-9708-019B960494DF}">
-                <a14:hiddenLine xmlns:a14="http://schemas.microsoft.com/office/drawing/2010/main" xmlns="" w="9525">
+                <a14:hiddenLine xmlns="" xmlns:a14="http://schemas.microsoft.com/office/drawing/2010/main" w="9525">
                   <a:solidFill>
                     <a:srgbClr val="000000"/>
                   </a:solidFill>
@@ -1287,7 +1292,7 @@
             </a:ln>
             <a:extLst>
               <a:ext uri="{91240B29-F687-4f45-9708-019B960494DF}">
-                <a14:hiddenLine xmlns:a14="http://schemas.microsoft.com/office/drawing/2010/main" xmlns="" w="9525">
+                <a14:hiddenLine xmlns="" xmlns:a14="http://schemas.microsoft.com/office/drawing/2010/main" w="9525">
                   <a:solidFill>
                     <a:srgbClr val="000000"/>
                   </a:solidFill>
@@ -1377,7 +1382,7 @@
             </a:ln>
             <a:extLst>
               <a:ext uri="{91240B29-F687-4f45-9708-019B960494DF}">
-                <a14:hiddenLine xmlns:a14="http://schemas.microsoft.com/office/drawing/2010/main" xmlns="" w="9525">
+                <a14:hiddenLine xmlns="" xmlns:a14="http://schemas.microsoft.com/office/drawing/2010/main" w="9525">
                   <a:solidFill>
                     <a:srgbClr val="000000"/>
                   </a:solidFill>
@@ -1467,7 +1472,7 @@
             </a:ln>
             <a:extLst>
               <a:ext uri="{91240B29-F687-4f45-9708-019B960494DF}">
-                <a14:hiddenLine xmlns:a14="http://schemas.microsoft.com/office/drawing/2010/main" xmlns="" w="9525">
+                <a14:hiddenLine xmlns="" xmlns:a14="http://schemas.microsoft.com/office/drawing/2010/main" w="9525">
                   <a:solidFill>
                     <a:srgbClr val="000000"/>
                   </a:solidFill>
@@ -1529,7 +1534,7 @@
             </a:ln>
             <a:extLst>
               <a:ext uri="{91240B29-F687-4f45-9708-019B960494DF}">
-                <a14:hiddenLine xmlns:a14="http://schemas.microsoft.com/office/drawing/2010/main" xmlns="" w="9525">
+                <a14:hiddenLine xmlns="" xmlns:a14="http://schemas.microsoft.com/office/drawing/2010/main" w="9525">
                   <a:solidFill>
                     <a:srgbClr val="000000"/>
                   </a:solidFill>
@@ -1619,7 +1624,7 @@
             </a:ln>
             <a:extLst>
               <a:ext uri="{91240B29-F687-4f45-9708-019B960494DF}">
-                <a14:hiddenLine xmlns:a14="http://schemas.microsoft.com/office/drawing/2010/main" xmlns="" w="9525">
+                <a14:hiddenLine xmlns="" xmlns:a14="http://schemas.microsoft.com/office/drawing/2010/main" w="9525">
                   <a:solidFill>
                     <a:srgbClr val="000000"/>
                   </a:solidFill>
@@ -1709,7 +1714,7 @@
             </a:ln>
             <a:extLst>
               <a:ext uri="{91240B29-F687-4f45-9708-019B960494DF}">
-                <a14:hiddenLine xmlns:a14="http://schemas.microsoft.com/office/drawing/2010/main" xmlns="" w="9525">
+                <a14:hiddenLine xmlns="" xmlns:a14="http://schemas.microsoft.com/office/drawing/2010/main" w="9525">
                   <a:solidFill>
                     <a:srgbClr val="000000"/>
                   </a:solidFill>
@@ -1765,7 +1770,7 @@
             </a:ln>
             <a:extLst>
               <a:ext uri="{91240B29-F687-4f45-9708-019B960494DF}">
-                <a14:hiddenLine xmlns:a14="http://schemas.microsoft.com/office/drawing/2010/main" xmlns="" w="9525">
+                <a14:hiddenLine xmlns="" xmlns:a14="http://schemas.microsoft.com/office/drawing/2010/main" w="9525">
                   <a:solidFill>
                     <a:srgbClr val="000000"/>
                   </a:solidFill>
@@ -1855,7 +1860,7 @@
             </a:ln>
             <a:extLst>
               <a:ext uri="{91240B29-F687-4f45-9708-019B960494DF}">
-                <a14:hiddenLine xmlns:a14="http://schemas.microsoft.com/office/drawing/2010/main" xmlns="" w="9525">
+                <a14:hiddenLine xmlns="" xmlns:a14="http://schemas.microsoft.com/office/drawing/2010/main" w="9525">
                   <a:solidFill>
                     <a:srgbClr val="000000"/>
                   </a:solidFill>
@@ -1911,7 +1916,7 @@
             </a:ln>
             <a:extLst>
               <a:ext uri="{91240B29-F687-4f45-9708-019B960494DF}">
-                <a14:hiddenLine xmlns:a14="http://schemas.microsoft.com/office/drawing/2010/main" xmlns="" w="9525">
+                <a14:hiddenLine xmlns="" xmlns:a14="http://schemas.microsoft.com/office/drawing/2010/main" w="9525">
                   <a:solidFill>
                     <a:srgbClr val="000000"/>
                   </a:solidFill>
@@ -2001,7 +2006,7 @@
             </a:ln>
             <a:extLst>
               <a:ext uri="{91240B29-F687-4f45-9708-019B960494DF}">
-                <a14:hiddenLine xmlns:a14="http://schemas.microsoft.com/office/drawing/2010/main" xmlns="" w="9525">
+                <a14:hiddenLine xmlns="" xmlns:a14="http://schemas.microsoft.com/office/drawing/2010/main" w="9525">
                   <a:solidFill>
                     <a:srgbClr val="000000"/>
                   </a:solidFill>
@@ -2069,7 +2074,7 @@
             </a:ln>
             <a:extLst>
               <a:ext uri="{91240B29-F687-4f45-9708-019B960494DF}">
-                <a14:hiddenLine xmlns:a14="http://schemas.microsoft.com/office/drawing/2010/main" xmlns="" w="9525">
+                <a14:hiddenLine xmlns="" xmlns:a14="http://schemas.microsoft.com/office/drawing/2010/main" w="9525">
                   <a:solidFill>
                     <a:srgbClr val="000000"/>
                   </a:solidFill>
@@ -2159,7 +2164,7 @@
             </a:ln>
             <a:extLst>
               <a:ext uri="{91240B29-F687-4f45-9708-019B960494DF}">
-                <a14:hiddenLine xmlns:a14="http://schemas.microsoft.com/office/drawing/2010/main" xmlns="" w="9525">
+                <a14:hiddenLine xmlns="" xmlns:a14="http://schemas.microsoft.com/office/drawing/2010/main" w="9525">
                   <a:solidFill>
                     <a:srgbClr val="000000"/>
                   </a:solidFill>
@@ -2227,7 +2232,7 @@
             </a:ln>
             <a:extLst>
               <a:ext uri="{91240B29-F687-4f45-9708-019B960494DF}">
-                <a14:hiddenLine xmlns:a14="http://schemas.microsoft.com/office/drawing/2010/main" xmlns="" w="9525">
+                <a14:hiddenLine xmlns="" xmlns:a14="http://schemas.microsoft.com/office/drawing/2010/main" w="9525">
                   <a:solidFill>
                     <a:srgbClr val="000000"/>
                   </a:solidFill>
@@ -2317,7 +2322,7 @@
             </a:ln>
             <a:extLst>
               <a:ext uri="{91240B29-F687-4f45-9708-019B960494DF}">
-                <a14:hiddenLine xmlns:a14="http://schemas.microsoft.com/office/drawing/2010/main" xmlns="" w="9525">
+                <a14:hiddenLine xmlns="" xmlns:a14="http://schemas.microsoft.com/office/drawing/2010/main" w="9525">
                   <a:solidFill>
                     <a:srgbClr val="000000"/>
                   </a:solidFill>
@@ -2351,7 +2356,7 @@
             </a:ln>
             <a:extLst>
               <a:ext uri="{91240B29-F687-4f45-9708-019B960494DF}">
-                <a14:hiddenLine xmlns:a14="http://schemas.microsoft.com/office/drawing/2010/main" xmlns="" w="9525">
+                <a14:hiddenLine xmlns="" xmlns:a14="http://schemas.microsoft.com/office/drawing/2010/main" w="9525">
                   <a:solidFill>
                     <a:srgbClr val="000000"/>
                   </a:solidFill>
@@ -2441,7 +2446,7 @@
             </a:ln>
             <a:extLst>
               <a:ext uri="{91240B29-F687-4f45-9708-019B960494DF}">
-                <a14:hiddenLine xmlns:a14="http://schemas.microsoft.com/office/drawing/2010/main" xmlns="" w="9525">
+                <a14:hiddenLine xmlns="" xmlns:a14="http://schemas.microsoft.com/office/drawing/2010/main" w="9525">
                   <a:solidFill>
                     <a:srgbClr val="000000"/>
                   </a:solidFill>
@@ -2503,7 +2508,7 @@
             </a:ln>
             <a:extLst>
               <a:ext uri="{91240B29-F687-4f45-9708-019B960494DF}">
-                <a14:hiddenLine xmlns:a14="http://schemas.microsoft.com/office/drawing/2010/main" xmlns="" w="9525">
+                <a14:hiddenLine xmlns="" xmlns:a14="http://schemas.microsoft.com/office/drawing/2010/main" w="9525">
                   <a:solidFill>
                     <a:srgbClr val="000000"/>
                   </a:solidFill>
@@ -2565,7 +2570,7 @@
             </a:ln>
             <a:extLst>
               <a:ext uri="{91240B29-F687-4f45-9708-019B960494DF}">
-                <a14:hiddenLine xmlns:a14="http://schemas.microsoft.com/office/drawing/2010/main" xmlns="" w="9525">
+                <a14:hiddenLine xmlns="" xmlns:a14="http://schemas.microsoft.com/office/drawing/2010/main" w="9525">
                   <a:solidFill>
                     <a:srgbClr val="000000"/>
                   </a:solidFill>
@@ -2655,7 +2660,7 @@
             </a:ln>
             <a:extLst>
               <a:ext uri="{91240B29-F687-4f45-9708-019B960494DF}">
-                <a14:hiddenLine xmlns:a14="http://schemas.microsoft.com/office/drawing/2010/main" xmlns="" w="9525">
+                <a14:hiddenLine xmlns="" xmlns:a14="http://schemas.microsoft.com/office/drawing/2010/main" w="9525">
                   <a:solidFill>
                     <a:srgbClr val="000000"/>
                   </a:solidFill>
@@ -2723,7 +2728,7 @@
             </a:ln>
             <a:extLst>
               <a:ext uri="{91240B29-F687-4f45-9708-019B960494DF}">
-                <a14:hiddenLine xmlns:a14="http://schemas.microsoft.com/office/drawing/2010/main" xmlns="" w="9525">
+                <a14:hiddenLine xmlns="" xmlns:a14="http://schemas.microsoft.com/office/drawing/2010/main" w="9525">
                   <a:solidFill>
                     <a:srgbClr val="000000"/>
                   </a:solidFill>
@@ -2785,7 +2790,7 @@
             </a:ln>
             <a:extLst>
               <a:ext uri="{91240B29-F687-4f45-9708-019B960494DF}">
-                <a14:hiddenLine xmlns:a14="http://schemas.microsoft.com/office/drawing/2010/main" xmlns="" w="9525">
+                <a14:hiddenLine xmlns="" xmlns:a14="http://schemas.microsoft.com/office/drawing/2010/main" w="9525">
                   <a:solidFill>
                     <a:srgbClr val="000000"/>
                   </a:solidFill>
@@ -2875,7 +2880,7 @@
             </a:ln>
             <a:extLst>
               <a:ext uri="{91240B29-F687-4f45-9708-019B960494DF}">
-                <a14:hiddenLine xmlns:a14="http://schemas.microsoft.com/office/drawing/2010/main" xmlns="" w="9525">
+                <a14:hiddenLine xmlns="" xmlns:a14="http://schemas.microsoft.com/office/drawing/2010/main" w="9525">
                   <a:solidFill>
                     <a:srgbClr val="000000"/>
                   </a:solidFill>
@@ -2937,7 +2942,7 @@
             </a:ln>
             <a:extLst>
               <a:ext uri="{91240B29-F687-4f45-9708-019B960494DF}">
-                <a14:hiddenLine xmlns:a14="http://schemas.microsoft.com/office/drawing/2010/main" xmlns="" w="9525">
+                <a14:hiddenLine xmlns="" xmlns:a14="http://schemas.microsoft.com/office/drawing/2010/main" w="9525">
                   <a:solidFill>
                     <a:srgbClr val="000000"/>
                   </a:solidFill>
@@ -3027,7 +3032,7 @@
             </a:ln>
             <a:extLst>
               <a:ext uri="{91240B29-F687-4f45-9708-019B960494DF}">
-                <a14:hiddenLine xmlns:a14="http://schemas.microsoft.com/office/drawing/2010/main" xmlns="" w="9525">
+                <a14:hiddenLine xmlns="" xmlns:a14="http://schemas.microsoft.com/office/drawing/2010/main" w="9525">
                   <a:solidFill>
                     <a:srgbClr val="000000"/>
                   </a:solidFill>
@@ -3089,7 +3094,7 @@
             </a:ln>
             <a:extLst>
               <a:ext uri="{91240B29-F687-4f45-9708-019B960494DF}">
-                <a14:hiddenLine xmlns:a14="http://schemas.microsoft.com/office/drawing/2010/main" xmlns="" w="9525">
+                <a14:hiddenLine xmlns="" xmlns:a14="http://schemas.microsoft.com/office/drawing/2010/main" w="9525">
                   <a:solidFill>
                     <a:srgbClr val="000000"/>
                   </a:solidFill>
@@ -3179,7 +3184,7 @@
             </a:ln>
             <a:extLst>
               <a:ext uri="{91240B29-F687-4f45-9708-019B960494DF}">
-                <a14:hiddenLine xmlns:a14="http://schemas.microsoft.com/office/drawing/2010/main" xmlns="" w="9525">
+                <a14:hiddenLine xmlns="" xmlns:a14="http://schemas.microsoft.com/office/drawing/2010/main" w="9525">
                   <a:solidFill>
                     <a:srgbClr val="000000"/>
                   </a:solidFill>
@@ -3213,7 +3218,7 @@
             </a:ln>
             <a:extLst>
               <a:ext uri="{91240B29-F687-4f45-9708-019B960494DF}">
-                <a14:hiddenLine xmlns:a14="http://schemas.microsoft.com/office/drawing/2010/main" xmlns="" w="9525">
+                <a14:hiddenLine xmlns="" xmlns:a14="http://schemas.microsoft.com/office/drawing/2010/main" w="9525">
                   <a:solidFill>
                     <a:srgbClr val="000000"/>
                   </a:solidFill>
@@ -3278,7 +3283,7 @@
             </a:ln>
             <a:extLst>
               <a:ext uri="{91240B29-F687-4f45-9708-019B960494DF}">
-                <a14:hiddenLine xmlns:a14="http://schemas.microsoft.com/office/drawing/2010/main" xmlns="" w="9525">
+                <a14:hiddenLine xmlns="" xmlns:a14="http://schemas.microsoft.com/office/drawing/2010/main" w="9525">
                   <a:solidFill>
                     <a:srgbClr val="000000"/>
                   </a:solidFill>
@@ -3368,7 +3373,7 @@
             </a:ln>
             <a:extLst>
               <a:ext uri="{91240B29-F687-4f45-9708-019B960494DF}">
-                <a14:hiddenLine xmlns:a14="http://schemas.microsoft.com/office/drawing/2010/main" xmlns="" w="9525">
+                <a14:hiddenLine xmlns="" xmlns:a14="http://schemas.microsoft.com/office/drawing/2010/main" w="9525">
                   <a:solidFill>
                     <a:srgbClr val="000000"/>
                   </a:solidFill>
@@ -3430,7 +3435,7 @@
             </a:ln>
             <a:extLst>
               <a:ext uri="{91240B29-F687-4f45-9708-019B960494DF}">
-                <a14:hiddenLine xmlns:a14="http://schemas.microsoft.com/office/drawing/2010/main" xmlns="" w="9525">
+                <a14:hiddenLine xmlns="" xmlns:a14="http://schemas.microsoft.com/office/drawing/2010/main" w="9525">
                   <a:solidFill>
                     <a:srgbClr val="000000"/>
                   </a:solidFill>
@@ -3520,7 +3525,7 @@
             </a:ln>
             <a:extLst>
               <a:ext uri="{91240B29-F687-4f45-9708-019B960494DF}">
-                <a14:hiddenLine xmlns:a14="http://schemas.microsoft.com/office/drawing/2010/main" xmlns="" w="9525">
+                <a14:hiddenLine xmlns="" xmlns:a14="http://schemas.microsoft.com/office/drawing/2010/main" w="9525">
                   <a:solidFill>
                     <a:srgbClr val="000000"/>
                   </a:solidFill>
@@ -3610,7 +3615,7 @@
             </a:ln>
             <a:extLst>
               <a:ext uri="{91240B29-F687-4f45-9708-019B960494DF}">
-                <a14:hiddenLine xmlns:a14="http://schemas.microsoft.com/office/drawing/2010/main" xmlns="" w="9525">
+                <a14:hiddenLine xmlns="" xmlns:a14="http://schemas.microsoft.com/office/drawing/2010/main" w="9525">
                   <a:solidFill>
                     <a:srgbClr val="000000"/>
                   </a:solidFill>
@@ -3675,7 +3680,7 @@
             </a:ln>
             <a:extLst>
               <a:ext uri="{91240B29-F687-4f45-9708-019B960494DF}">
-                <a14:hiddenLine xmlns:a14="http://schemas.microsoft.com/office/drawing/2010/main" xmlns="" w="9525">
+                <a14:hiddenLine xmlns="" xmlns:a14="http://schemas.microsoft.com/office/drawing/2010/main" w="9525">
                   <a:solidFill>
                     <a:srgbClr val="000000"/>
                   </a:solidFill>
@@ -3737,7 +3742,7 @@
             </a:ln>
             <a:extLst>
               <a:ext uri="{91240B29-F687-4f45-9708-019B960494DF}">
-                <a14:hiddenLine xmlns:a14="http://schemas.microsoft.com/office/drawing/2010/main" xmlns="" w="9525">
+                <a14:hiddenLine xmlns="" xmlns:a14="http://schemas.microsoft.com/office/drawing/2010/main" w="9525">
                   <a:solidFill>
                     <a:srgbClr val="000000"/>
                   </a:solidFill>
@@ -3827,7 +3832,7 @@
             </a:ln>
             <a:extLst>
               <a:ext uri="{91240B29-F687-4f45-9708-019B960494DF}">
-                <a14:hiddenLine xmlns:a14="http://schemas.microsoft.com/office/drawing/2010/main" xmlns="" w="9525">
+                <a14:hiddenLine xmlns="" xmlns:a14="http://schemas.microsoft.com/office/drawing/2010/main" w="9525">
                   <a:solidFill>
                     <a:srgbClr val="000000"/>
                   </a:solidFill>
@@ -3917,7 +3922,7 @@
             </a:ln>
             <a:extLst>
               <a:ext uri="{91240B29-F687-4f45-9708-019B960494DF}">
-                <a14:hiddenLine xmlns:a14="http://schemas.microsoft.com/office/drawing/2010/main" xmlns="" w="9525">
+                <a14:hiddenLine xmlns="" xmlns:a14="http://schemas.microsoft.com/office/drawing/2010/main" w="9525">
                   <a:solidFill>
                     <a:srgbClr val="000000"/>
                   </a:solidFill>
@@ -3979,7 +3984,7 @@
             </a:ln>
             <a:extLst>
               <a:ext uri="{91240B29-F687-4f45-9708-019B960494DF}">
-                <a14:hiddenLine xmlns:a14="http://schemas.microsoft.com/office/drawing/2010/main" xmlns="" w="9525">
+                <a14:hiddenLine xmlns="" xmlns:a14="http://schemas.microsoft.com/office/drawing/2010/main" w="9525">
                   <a:solidFill>
                     <a:srgbClr val="000000"/>
                   </a:solidFill>
@@ -4099,7 +4104,7 @@
             </a:ln>
             <a:extLst>
               <a:ext uri="{91240B29-F687-4f45-9708-019B960494DF}">
-                <a14:hiddenLine xmlns:a14="http://schemas.microsoft.com/office/drawing/2010/main" xmlns="" w="9525">
+                <a14:hiddenLine xmlns="" xmlns:a14="http://schemas.microsoft.com/office/drawing/2010/main" w="9525">
                   <a:solidFill>
                     <a:srgbClr val="000000"/>
                   </a:solidFill>
@@ -4167,7 +4172,7 @@
             </a:ln>
             <a:extLst>
               <a:ext uri="{91240B29-F687-4f45-9708-019B960494DF}">
-                <a14:hiddenLine xmlns:a14="http://schemas.microsoft.com/office/drawing/2010/main" xmlns="" w="9525">
+                <a14:hiddenLine xmlns="" xmlns:a14="http://schemas.microsoft.com/office/drawing/2010/main" w="9525">
                   <a:solidFill>
                     <a:srgbClr val="000000"/>
                   </a:solidFill>
@@ -4257,7 +4262,7 @@
             </a:ln>
             <a:extLst>
               <a:ext uri="{91240B29-F687-4f45-9708-019B960494DF}">
-                <a14:hiddenLine xmlns:a14="http://schemas.microsoft.com/office/drawing/2010/main" xmlns="" w="9525">
+                <a14:hiddenLine xmlns="" xmlns:a14="http://schemas.microsoft.com/office/drawing/2010/main" w="9525">
                   <a:solidFill>
                     <a:srgbClr val="000000"/>
                   </a:solidFill>
@@ -4397,7 +4402,7 @@
           <a:p>
             <a:fld id="{672B56DD-F675-426A-ACFC-E24B11EDFCE9}" type="datetimeFigureOut">
               <a:rPr lang="en-US" smtClean="0"/>
-              <a:t>4/3/2023</a:t>
+              <a:t>4/4/2023</a:t>
             </a:fld>
             <a:endParaRPr lang="en-US"/>
           </a:p>
@@ -4664,7 +4669,7 @@
           <a:p>
             <a:fld id="{672B56DD-F675-426A-ACFC-E24B11EDFCE9}" type="datetimeFigureOut">
               <a:rPr lang="en-US" smtClean="0"/>
-              <a:t>4/3/2023</a:t>
+              <a:t>4/4/2023</a:t>
             </a:fld>
             <a:endParaRPr lang="en-US"/>
           </a:p>
@@ -4860,7 +4865,7 @@
           <a:p>
             <a:fld id="{672B56DD-F675-426A-ACFC-E24B11EDFCE9}" type="datetimeFigureOut">
               <a:rPr lang="en-US" smtClean="0"/>
-              <a:t>4/3/2023</a:t>
+              <a:t>4/4/2023</a:t>
             </a:fld>
             <a:endParaRPr lang="en-US"/>
           </a:p>
@@ -5123,7 +5128,7 @@
           <a:p>
             <a:fld id="{672B56DD-F675-426A-ACFC-E24B11EDFCE9}" type="datetimeFigureOut">
               <a:rPr lang="en-US" smtClean="0"/>
-              <a:t>4/3/2023</a:t>
+              <a:t>4/4/2023</a:t>
             </a:fld>
             <a:endParaRPr lang="en-US"/>
           </a:p>
@@ -5557,7 +5562,7 @@
           <a:p>
             <a:fld id="{672B56DD-F675-426A-ACFC-E24B11EDFCE9}" type="datetimeFigureOut">
               <a:rPr lang="en-US" smtClean="0"/>
-              <a:t>4/3/2023</a:t>
+              <a:t>4/4/2023</a:t>
             </a:fld>
             <a:endParaRPr lang="en-US"/>
           </a:p>
@@ -6103,7 +6108,7 @@
           <a:p>
             <a:fld id="{672B56DD-F675-426A-ACFC-E24B11EDFCE9}" type="datetimeFigureOut">
               <a:rPr lang="en-US" smtClean="0"/>
-              <a:t>4/3/2023</a:t>
+              <a:t>4/4/2023</a:t>
             </a:fld>
             <a:endParaRPr lang="en-US"/>
           </a:p>
@@ -6823,7 +6828,7 @@
           <a:p>
             <a:fld id="{672B56DD-F675-426A-ACFC-E24B11EDFCE9}" type="datetimeFigureOut">
               <a:rPr lang="en-US" smtClean="0"/>
-              <a:t>4/3/2023</a:t>
+              <a:t>4/4/2023</a:t>
             </a:fld>
             <a:endParaRPr lang="en-US"/>
           </a:p>
@@ -6993,7 +6998,7 @@
           <a:p>
             <a:fld id="{672B56DD-F675-426A-ACFC-E24B11EDFCE9}" type="datetimeFigureOut">
               <a:rPr lang="en-US" smtClean="0"/>
-              <a:t>4/3/2023</a:t>
+              <a:t>4/4/2023</a:t>
             </a:fld>
             <a:endParaRPr lang="en-US"/>
           </a:p>
@@ -7173,7 +7178,7 @@
           <a:p>
             <a:fld id="{672B56DD-F675-426A-ACFC-E24B11EDFCE9}" type="datetimeFigureOut">
               <a:rPr lang="en-US" smtClean="0"/>
-              <a:t>4/3/2023</a:t>
+              <a:t>4/4/2023</a:t>
             </a:fld>
             <a:endParaRPr lang="en-US"/>
           </a:p>
@@ -7343,7 +7348,7 @@
           <a:p>
             <a:fld id="{672B56DD-F675-426A-ACFC-E24B11EDFCE9}" type="datetimeFigureOut">
               <a:rPr lang="en-US" smtClean="0"/>
-              <a:t>4/3/2023</a:t>
+              <a:t>4/4/2023</a:t>
             </a:fld>
             <a:endParaRPr lang="en-US"/>
           </a:p>
@@ -7593,7 +7598,7 @@
           <a:p>
             <a:fld id="{672B56DD-F675-426A-ACFC-E24B11EDFCE9}" type="datetimeFigureOut">
               <a:rPr lang="en-US" smtClean="0"/>
-              <a:t>4/3/2023</a:t>
+              <a:t>4/4/2023</a:t>
             </a:fld>
             <a:endParaRPr lang="en-US"/>
           </a:p>
@@ -7825,7 +7830,7 @@
           <a:p>
             <a:fld id="{672B56DD-F675-426A-ACFC-E24B11EDFCE9}" type="datetimeFigureOut">
               <a:rPr lang="en-US" smtClean="0"/>
-              <a:t>4/3/2023</a:t>
+              <a:t>4/4/2023</a:t>
             </a:fld>
             <a:endParaRPr lang="en-US"/>
           </a:p>
@@ -8206,7 +8211,7 @@
           <a:p>
             <a:fld id="{672B56DD-F675-426A-ACFC-E24B11EDFCE9}" type="datetimeFigureOut">
               <a:rPr lang="en-US" smtClean="0"/>
-              <a:t>4/3/2023</a:t>
+              <a:t>4/4/2023</a:t>
             </a:fld>
             <a:endParaRPr lang="en-US"/>
           </a:p>
@@ -8324,7 +8329,7 @@
           <a:p>
             <a:fld id="{672B56DD-F675-426A-ACFC-E24B11EDFCE9}" type="datetimeFigureOut">
               <a:rPr lang="en-US" smtClean="0"/>
-              <a:t>4/3/2023</a:t>
+              <a:t>4/4/2023</a:t>
             </a:fld>
             <a:endParaRPr lang="en-US"/>
           </a:p>
@@ -8419,7 +8424,7 @@
           <a:p>
             <a:fld id="{672B56DD-F675-426A-ACFC-E24B11EDFCE9}" type="datetimeFigureOut">
               <a:rPr lang="en-US" smtClean="0"/>
-              <a:t>4/3/2023</a:t>
+              <a:t>4/4/2023</a:t>
             </a:fld>
             <a:endParaRPr lang="en-US"/>
           </a:p>
@@ -8668,7 +8673,7 @@
           <a:p>
             <a:fld id="{672B56DD-F675-426A-ACFC-E24B11EDFCE9}" type="datetimeFigureOut">
               <a:rPr lang="en-US" smtClean="0"/>
-              <a:t>4/3/2023</a:t>
+              <a:t>4/4/2023</a:t>
             </a:fld>
             <a:endParaRPr lang="en-US"/>
           </a:p>
@@ -8948,7 +8953,7 @@
           <a:p>
             <a:fld id="{672B56DD-F675-426A-ACFC-E24B11EDFCE9}" type="datetimeFigureOut">
               <a:rPr lang="en-US" smtClean="0"/>
-              <a:t>4/3/2023</a:t>
+              <a:t>4/4/2023</a:t>
             </a:fld>
             <a:endParaRPr lang="en-US"/>
           </a:p>
@@ -9071,7 +9076,7 @@
           <a:noFill/>
           <a:extLst>
             <a:ext uri="{909E8E84-426E-40dd-AFC4-6F175D3DCCD1}">
-              <a14:hiddenFill xmlns:a14="http://schemas.microsoft.com/office/drawing/2010/main" xmlns="">
+              <a14:hiddenFill xmlns="" xmlns:a14="http://schemas.microsoft.com/office/drawing/2010/main">
                 <a:solidFill>
                   <a:srgbClr val="FFFFFF"/>
                 </a:solidFill>
@@ -9145,7 +9150,7 @@
               </a:ln>
               <a:extLst>
                 <a:ext uri="{91240B29-F687-4f45-9708-019B960494DF}">
-                  <a14:hiddenLine xmlns:a14="http://schemas.microsoft.com/office/drawing/2010/main" xmlns="" w="9525">
+                  <a14:hiddenLine xmlns="" xmlns:a14="http://schemas.microsoft.com/office/drawing/2010/main" w="9525">
                     <a:solidFill>
                       <a:srgbClr val="000000"/>
                     </a:solidFill>
@@ -9235,7 +9240,7 @@
               </a:ln>
               <a:extLst>
                 <a:ext uri="{91240B29-F687-4f45-9708-019B960494DF}">
-                  <a14:hiddenLine xmlns:a14="http://schemas.microsoft.com/office/drawing/2010/main" xmlns="" w="9525">
+                  <a14:hiddenLine xmlns="" xmlns:a14="http://schemas.microsoft.com/office/drawing/2010/main" w="9525">
                     <a:solidFill>
                       <a:srgbClr val="000000"/>
                     </a:solidFill>
@@ -9325,7 +9330,7 @@
               </a:ln>
               <a:extLst>
                 <a:ext uri="{91240B29-F687-4f45-9708-019B960494DF}">
-                  <a14:hiddenLine xmlns:a14="http://schemas.microsoft.com/office/drawing/2010/main" xmlns="" w="9525">
+                  <a14:hiddenLine xmlns="" xmlns:a14="http://schemas.microsoft.com/office/drawing/2010/main" w="9525">
                     <a:solidFill>
                       <a:srgbClr val="000000"/>
                     </a:solidFill>
@@ -9387,7 +9392,7 @@
               </a:ln>
               <a:extLst>
                 <a:ext uri="{91240B29-F687-4f45-9708-019B960494DF}">
-                  <a14:hiddenLine xmlns:a14="http://schemas.microsoft.com/office/drawing/2010/main" xmlns="" w="9525">
+                  <a14:hiddenLine xmlns="" xmlns:a14="http://schemas.microsoft.com/office/drawing/2010/main" w="9525">
                     <a:solidFill>
                       <a:srgbClr val="000000"/>
                     </a:solidFill>
@@ -9477,7 +9482,7 @@
               </a:ln>
               <a:extLst>
                 <a:ext uri="{91240B29-F687-4f45-9708-019B960494DF}">
-                  <a14:hiddenLine xmlns:a14="http://schemas.microsoft.com/office/drawing/2010/main" xmlns="" w="9525">
+                  <a14:hiddenLine xmlns="" xmlns:a14="http://schemas.microsoft.com/office/drawing/2010/main" w="9525">
                     <a:solidFill>
                       <a:srgbClr val="000000"/>
                     </a:solidFill>
@@ -9539,7 +9544,7 @@
               </a:ln>
               <a:extLst>
                 <a:ext uri="{91240B29-F687-4f45-9708-019B960494DF}">
-                  <a14:hiddenLine xmlns:a14="http://schemas.microsoft.com/office/drawing/2010/main" xmlns="" w="9525">
+                  <a14:hiddenLine xmlns="" xmlns:a14="http://schemas.microsoft.com/office/drawing/2010/main" w="9525">
                     <a:solidFill>
                       <a:srgbClr val="000000"/>
                     </a:solidFill>
@@ -9601,7 +9606,7 @@
               </a:ln>
               <a:extLst>
                 <a:ext uri="{91240B29-F687-4f45-9708-019B960494DF}">
-                  <a14:hiddenLine xmlns:a14="http://schemas.microsoft.com/office/drawing/2010/main" xmlns="" w="9525">
+                  <a14:hiddenLine xmlns="" xmlns:a14="http://schemas.microsoft.com/office/drawing/2010/main" w="9525">
                     <a:solidFill>
                       <a:srgbClr val="000000"/>
                     </a:solidFill>
@@ -9691,7 +9696,7 @@
               </a:ln>
               <a:extLst>
                 <a:ext uri="{91240B29-F687-4f45-9708-019B960494DF}">
-                  <a14:hiddenLine xmlns:a14="http://schemas.microsoft.com/office/drawing/2010/main" xmlns="" w="9525">
+                  <a14:hiddenLine xmlns="" xmlns:a14="http://schemas.microsoft.com/office/drawing/2010/main" w="9525">
                     <a:solidFill>
                       <a:srgbClr val="000000"/>
                     </a:solidFill>
@@ -9781,7 +9786,7 @@
               </a:ln>
               <a:extLst>
                 <a:ext uri="{91240B29-F687-4f45-9708-019B960494DF}">
-                  <a14:hiddenLine xmlns:a14="http://schemas.microsoft.com/office/drawing/2010/main" xmlns="" w="9525">
+                  <a14:hiddenLine xmlns="" xmlns:a14="http://schemas.microsoft.com/office/drawing/2010/main" w="9525">
                     <a:solidFill>
                       <a:srgbClr val="000000"/>
                     </a:solidFill>
@@ -9843,7 +9848,7 @@
               </a:ln>
               <a:extLst>
                 <a:ext uri="{91240B29-F687-4f45-9708-019B960494DF}">
-                  <a14:hiddenLine xmlns:a14="http://schemas.microsoft.com/office/drawing/2010/main" xmlns="" w="9525">
+                  <a14:hiddenLine xmlns="" xmlns:a14="http://schemas.microsoft.com/office/drawing/2010/main" w="9525">
                     <a:solidFill>
                       <a:srgbClr val="000000"/>
                     </a:solidFill>
@@ -9953,7 +9958,7 @@
               </a:ln>
               <a:extLst>
                 <a:ext uri="{91240B29-F687-4f45-9708-019B960494DF}">
-                  <a14:hiddenLine xmlns:a14="http://schemas.microsoft.com/office/drawing/2010/main" xmlns="" w="9525">
+                  <a14:hiddenLine xmlns="" xmlns:a14="http://schemas.microsoft.com/office/drawing/2010/main" w="9525">
                     <a:solidFill>
                       <a:srgbClr val="000000"/>
                     </a:solidFill>
@@ -10037,7 +10042,7 @@
               </a:ln>
               <a:extLst>
                 <a:ext uri="{91240B29-F687-4f45-9708-019B960494DF}">
-                  <a14:hiddenLine xmlns:a14="http://schemas.microsoft.com/office/drawing/2010/main" xmlns="" w="9525">
+                  <a14:hiddenLine xmlns="" xmlns:a14="http://schemas.microsoft.com/office/drawing/2010/main" w="9525">
                     <a:solidFill>
                       <a:srgbClr val="000000"/>
                     </a:solidFill>
@@ -10099,7 +10104,7 @@
               </a:ln>
               <a:extLst>
                 <a:ext uri="{91240B29-F687-4f45-9708-019B960494DF}">
-                  <a14:hiddenLine xmlns:a14="http://schemas.microsoft.com/office/drawing/2010/main" xmlns="" w="9525">
+                  <a14:hiddenLine xmlns="" xmlns:a14="http://schemas.microsoft.com/office/drawing/2010/main" w="9525">
                     <a:solidFill>
                       <a:srgbClr val="000000"/>
                     </a:solidFill>
@@ -10161,7 +10166,7 @@
               </a:ln>
               <a:extLst>
                 <a:ext uri="{91240B29-F687-4f45-9708-019B960494DF}">
-                  <a14:hiddenLine xmlns:a14="http://schemas.microsoft.com/office/drawing/2010/main" xmlns="" w="9525">
+                  <a14:hiddenLine xmlns="" xmlns:a14="http://schemas.microsoft.com/office/drawing/2010/main" w="9525">
                     <a:solidFill>
                       <a:srgbClr val="000000"/>
                     </a:solidFill>
@@ -10251,7 +10256,7 @@
               </a:ln>
               <a:extLst>
                 <a:ext uri="{91240B29-F687-4f45-9708-019B960494DF}">
-                  <a14:hiddenLine xmlns:a14="http://schemas.microsoft.com/office/drawing/2010/main" xmlns="" w="9525">
+                  <a14:hiddenLine xmlns="" xmlns:a14="http://schemas.microsoft.com/office/drawing/2010/main" w="9525">
                     <a:solidFill>
                       <a:srgbClr val="000000"/>
                     </a:solidFill>
@@ -10285,7 +10290,7 @@
               </a:ln>
               <a:extLst>
                 <a:ext uri="{91240B29-F687-4f45-9708-019B960494DF}">
-                  <a14:hiddenLine xmlns:a14="http://schemas.microsoft.com/office/drawing/2010/main" xmlns="" w="9525">
+                  <a14:hiddenLine xmlns="" xmlns:a14="http://schemas.microsoft.com/office/drawing/2010/main" w="9525">
                     <a:solidFill>
                       <a:srgbClr val="000000"/>
                     </a:solidFill>
@@ -10350,7 +10355,7 @@
               </a:ln>
               <a:extLst>
                 <a:ext uri="{91240B29-F687-4f45-9708-019B960494DF}">
-                  <a14:hiddenLine xmlns:a14="http://schemas.microsoft.com/office/drawing/2010/main" xmlns="" w="9525">
+                  <a14:hiddenLine xmlns="" xmlns:a14="http://schemas.microsoft.com/office/drawing/2010/main" w="9525">
                     <a:solidFill>
                       <a:srgbClr val="000000"/>
                     </a:solidFill>
@@ -10440,7 +10445,7 @@
               </a:ln>
               <a:extLst>
                 <a:ext uri="{91240B29-F687-4f45-9708-019B960494DF}">
-                  <a14:hiddenLine xmlns:a14="http://schemas.microsoft.com/office/drawing/2010/main" xmlns="" w="9525">
+                  <a14:hiddenLine xmlns="" xmlns:a14="http://schemas.microsoft.com/office/drawing/2010/main" w="9525">
                     <a:solidFill>
                       <a:srgbClr val="000000"/>
                     </a:solidFill>
@@ -10502,7 +10507,7 @@
               </a:ln>
               <a:extLst>
                 <a:ext uri="{91240B29-F687-4f45-9708-019B960494DF}">
-                  <a14:hiddenLine xmlns:a14="http://schemas.microsoft.com/office/drawing/2010/main" xmlns="" w="9525">
+                  <a14:hiddenLine xmlns="" xmlns:a14="http://schemas.microsoft.com/office/drawing/2010/main" w="9525">
                     <a:solidFill>
                       <a:srgbClr val="000000"/>
                     </a:solidFill>
@@ -10592,7 +10597,7 @@
               </a:ln>
               <a:extLst>
                 <a:ext uri="{91240B29-F687-4f45-9708-019B960494DF}">
-                  <a14:hiddenLine xmlns:a14="http://schemas.microsoft.com/office/drawing/2010/main" xmlns="" w="9525">
+                  <a14:hiddenLine xmlns="" xmlns:a14="http://schemas.microsoft.com/office/drawing/2010/main" w="9525">
                     <a:solidFill>
                       <a:srgbClr val="000000"/>
                     </a:solidFill>
@@ -10657,7 +10662,7 @@
               </a:ln>
               <a:extLst>
                 <a:ext uri="{91240B29-F687-4f45-9708-019B960494DF}">
-                  <a14:hiddenLine xmlns:a14="http://schemas.microsoft.com/office/drawing/2010/main" xmlns="" w="9525">
+                  <a14:hiddenLine xmlns="" xmlns:a14="http://schemas.microsoft.com/office/drawing/2010/main" w="9525">
                     <a:solidFill>
                       <a:srgbClr val="000000"/>
                     </a:solidFill>
@@ -10719,7 +10724,7 @@
               </a:ln>
               <a:extLst>
                 <a:ext uri="{91240B29-F687-4f45-9708-019B960494DF}">
-                  <a14:hiddenLine xmlns:a14="http://schemas.microsoft.com/office/drawing/2010/main" xmlns="" w="9525">
+                  <a14:hiddenLine xmlns="" xmlns:a14="http://schemas.microsoft.com/office/drawing/2010/main" w="9525">
                     <a:solidFill>
                       <a:srgbClr val="000000"/>
                     </a:solidFill>
@@ -10809,7 +10814,7 @@
               </a:ln>
               <a:extLst>
                 <a:ext uri="{91240B29-F687-4f45-9708-019B960494DF}">
-                  <a14:hiddenLine xmlns:a14="http://schemas.microsoft.com/office/drawing/2010/main" xmlns="" w="9525">
+                  <a14:hiddenLine xmlns="" xmlns:a14="http://schemas.microsoft.com/office/drawing/2010/main" w="9525">
                     <a:solidFill>
                       <a:srgbClr val="000000"/>
                     </a:solidFill>
@@ -10899,7 +10904,7 @@
               </a:ln>
               <a:extLst>
                 <a:ext uri="{91240B29-F687-4f45-9708-019B960494DF}">
-                  <a14:hiddenLine xmlns:a14="http://schemas.microsoft.com/office/drawing/2010/main" xmlns="" w="9525">
+                  <a14:hiddenLine xmlns="" xmlns:a14="http://schemas.microsoft.com/office/drawing/2010/main" w="9525">
                     <a:solidFill>
                       <a:srgbClr val="000000"/>
                     </a:solidFill>
@@ -10964,7 +10969,7 @@
               </a:ln>
               <a:extLst>
                 <a:ext uri="{91240B29-F687-4f45-9708-019B960494DF}">
-                  <a14:hiddenLine xmlns:a14="http://schemas.microsoft.com/office/drawing/2010/main" xmlns="" w="9525">
+                  <a14:hiddenLine xmlns="" xmlns:a14="http://schemas.microsoft.com/office/drawing/2010/main" w="9525">
                     <a:solidFill>
                       <a:srgbClr val="000000"/>
                     </a:solidFill>
@@ -11084,7 +11089,7 @@
               </a:ln>
               <a:extLst>
                 <a:ext uri="{91240B29-F687-4f45-9708-019B960494DF}">
-                  <a14:hiddenLine xmlns:a14="http://schemas.microsoft.com/office/drawing/2010/main" xmlns="" w="9525">
+                  <a14:hiddenLine xmlns="" xmlns:a14="http://schemas.microsoft.com/office/drawing/2010/main" w="9525">
                     <a:solidFill>
                       <a:srgbClr val="000000"/>
                     </a:solidFill>
@@ -11165,7 +11170,7 @@
               </a:ln>
               <a:extLst>
                 <a:ext uri="{91240B29-F687-4f45-9708-019B960494DF}">
-                  <a14:hiddenLine xmlns:a14="http://schemas.microsoft.com/office/drawing/2010/main" xmlns="" w="9525">
+                  <a14:hiddenLine xmlns="" xmlns:a14="http://schemas.microsoft.com/office/drawing/2010/main" w="9525">
                     <a:solidFill>
                       <a:srgbClr val="000000"/>
                     </a:solidFill>
@@ -11280,7 +11285,7 @@
               </a:ln>
               <a:extLst>
                 <a:ext uri="{91240B29-F687-4f45-9708-019B960494DF}">
-                  <a14:hiddenLine xmlns:a14="http://schemas.microsoft.com/office/drawing/2010/main" xmlns="" w="9525">
+                  <a14:hiddenLine xmlns="" xmlns:a14="http://schemas.microsoft.com/office/drawing/2010/main" w="9525">
                     <a:solidFill>
                       <a:srgbClr val="000000"/>
                     </a:solidFill>
@@ -11370,7 +11375,7 @@
               </a:ln>
               <a:extLst>
                 <a:ext uri="{91240B29-F687-4f45-9708-019B960494DF}">
-                  <a14:hiddenLine xmlns:a14="http://schemas.microsoft.com/office/drawing/2010/main" xmlns="" w="9525">
+                  <a14:hiddenLine xmlns="" xmlns:a14="http://schemas.microsoft.com/office/drawing/2010/main" w="9525">
                     <a:solidFill>
                       <a:srgbClr val="000000"/>
                     </a:solidFill>
@@ -11435,7 +11440,7 @@
               </a:ln>
               <a:extLst>
                 <a:ext uri="{91240B29-F687-4f45-9708-019B960494DF}">
-                  <a14:hiddenLine xmlns:a14="http://schemas.microsoft.com/office/drawing/2010/main" xmlns="" w="9525">
+                  <a14:hiddenLine xmlns="" xmlns:a14="http://schemas.microsoft.com/office/drawing/2010/main" w="9525">
                     <a:solidFill>
                       <a:srgbClr val="000000"/>
                     </a:solidFill>
@@ -11525,7 +11530,7 @@
               </a:ln>
               <a:extLst>
                 <a:ext uri="{91240B29-F687-4f45-9708-019B960494DF}">
-                  <a14:hiddenLine xmlns:a14="http://schemas.microsoft.com/office/drawing/2010/main" xmlns="" w="9525">
+                  <a14:hiddenLine xmlns="" xmlns:a14="http://schemas.microsoft.com/office/drawing/2010/main" w="9525">
                     <a:solidFill>
                       <a:srgbClr val="000000"/>
                     </a:solidFill>
@@ -11593,7 +11598,7 @@
               </a:ln>
               <a:extLst>
                 <a:ext uri="{91240B29-F687-4f45-9708-019B960494DF}">
-                  <a14:hiddenLine xmlns:a14="http://schemas.microsoft.com/office/drawing/2010/main" xmlns="" w="9525">
+                  <a14:hiddenLine xmlns="" xmlns:a14="http://schemas.microsoft.com/office/drawing/2010/main" w="9525">
                     <a:solidFill>
                       <a:srgbClr val="000000"/>
                     </a:solidFill>
@@ -11683,7 +11688,7 @@
               </a:ln>
               <a:extLst>
                 <a:ext uri="{91240B29-F687-4f45-9708-019B960494DF}">
-                  <a14:hiddenLine xmlns:a14="http://schemas.microsoft.com/office/drawing/2010/main" xmlns="" w="9525">
+                  <a14:hiddenLine xmlns="" xmlns:a14="http://schemas.microsoft.com/office/drawing/2010/main" w="9525">
                     <a:solidFill>
                       <a:srgbClr val="000000"/>
                     </a:solidFill>
@@ -11751,7 +11756,7 @@
               </a:ln>
               <a:extLst>
                 <a:ext uri="{91240B29-F687-4f45-9708-019B960494DF}">
-                  <a14:hiddenLine xmlns:a14="http://schemas.microsoft.com/office/drawing/2010/main" xmlns="" w="9525">
+                  <a14:hiddenLine xmlns="" xmlns:a14="http://schemas.microsoft.com/office/drawing/2010/main" w="9525">
                     <a:solidFill>
                       <a:srgbClr val="000000"/>
                     </a:solidFill>
@@ -11841,7 +11846,7 @@
               </a:ln>
               <a:extLst>
                 <a:ext uri="{91240B29-F687-4f45-9708-019B960494DF}">
-                  <a14:hiddenLine xmlns:a14="http://schemas.microsoft.com/office/drawing/2010/main" xmlns="" w="9525">
+                  <a14:hiddenLine xmlns="" xmlns:a14="http://schemas.microsoft.com/office/drawing/2010/main" w="9525">
                     <a:solidFill>
                       <a:srgbClr val="000000"/>
                     </a:solidFill>
@@ -11875,7 +11880,7 @@
               </a:ln>
               <a:extLst>
                 <a:ext uri="{91240B29-F687-4f45-9708-019B960494DF}">
-                  <a14:hiddenLine xmlns:a14="http://schemas.microsoft.com/office/drawing/2010/main" xmlns="" w="9525">
+                  <a14:hiddenLine xmlns="" xmlns:a14="http://schemas.microsoft.com/office/drawing/2010/main" w="9525">
                     <a:solidFill>
                       <a:srgbClr val="000000"/>
                     </a:solidFill>
@@ -12015,7 +12020,7 @@
           <a:p>
             <a:fld id="{672B56DD-F675-426A-ACFC-E24B11EDFCE9}" type="datetimeFigureOut">
               <a:rPr lang="en-US" smtClean="0"/>
-              <a:t>4/3/2023</a:t>
+              <a:t>4/4/2023</a:t>
             </a:fld>
             <a:endParaRPr lang="en-US"/>
           </a:p>
@@ -15440,12 +15445,14 @@
         </p:nvSpPr>
         <p:spPr/>
         <p:txBody>
-          <a:bodyPr/>
+          <a:bodyPr>
+            <a:normAutofit fontScale="92500" lnSpcReduction="10000"/>
+          </a:bodyPr>
           <a:lstStyle/>
           <a:p>
             <a:r>
               <a:rPr lang="en-US" dirty="0"/>
-              <a:t>No experience with Qt Framework</a:t>
+              <a:t>No experience with Qt Framework in general</a:t>
             </a:r>
           </a:p>
           <a:p>
@@ -15481,6 +15488,7 @@
               </a:rPr>
               <a:t>.</a:t>
             </a:r>
+            <a:endParaRPr lang="en-US" dirty="0"/>
           </a:p>
           <a:p>
             <a:r>
@@ -15496,7 +15504,17 @@
             </a:r>
           </a:p>
           <a:p>
-            <a:endParaRPr lang="en-US" dirty="0"/>
+            <a:r>
+              <a:rPr lang="en-US" dirty="0"/>
+              <a:t>Connecting database to application</a:t>
+            </a:r>
+          </a:p>
+          <a:p>
+            <a:pPr lvl="1"/>
+            <a:r>
+              <a:rPr lang="en-US" dirty="0"/>
+              <a:t>Ran into issues compiling plugin necessary for connecting to MySQL specifically. Overcame by paying attention to logs and following advice online from people in similar situations.</a:t>
+            </a:r>
           </a:p>
         </p:txBody>
       </p:sp>

</xml_diff>